<commit_message>
end esp32 except motor
</commit_message>
<xml_diff>
--- a/ppt/IoT20-MicropythonBus.pptx
+++ b/ppt/IoT20-MicropythonBus.pptx
@@ -5,29 +5,31 @@
     <p:sldMasterId id="2147483653" r:id="rId1"/>
   </p:sldMasterIdLst>
   <p:notesMasterIdLst>
-    <p:notesMasterId r:id="rId19"/>
+    <p:notesMasterId r:id="rId21"/>
   </p:notesMasterIdLst>
   <p:handoutMasterIdLst>
-    <p:handoutMasterId r:id="rId20"/>
+    <p:handoutMasterId r:id="rId22"/>
   </p:handoutMasterIdLst>
   <p:sldIdLst>
     <p:sldId id="264" r:id="rId2"/>
-    <p:sldId id="289" r:id="rId3"/>
-    <p:sldId id="287" r:id="rId4"/>
-    <p:sldId id="286" r:id="rId5"/>
-    <p:sldId id="283" r:id="rId6"/>
-    <p:sldId id="290" r:id="rId7"/>
-    <p:sldId id="294" r:id="rId8"/>
-    <p:sldId id="284" r:id="rId9"/>
-    <p:sldId id="298" r:id="rId10"/>
-    <p:sldId id="285" r:id="rId11"/>
-    <p:sldId id="297" r:id="rId12"/>
-    <p:sldId id="299" r:id="rId13"/>
-    <p:sldId id="303" r:id="rId14"/>
-    <p:sldId id="292" r:id="rId15"/>
-    <p:sldId id="293" r:id="rId16"/>
-    <p:sldId id="304" r:id="rId17"/>
-    <p:sldId id="296" r:id="rId18"/>
+    <p:sldId id="305" r:id="rId3"/>
+    <p:sldId id="306" r:id="rId4"/>
+    <p:sldId id="289" r:id="rId5"/>
+    <p:sldId id="287" r:id="rId6"/>
+    <p:sldId id="286" r:id="rId7"/>
+    <p:sldId id="283" r:id="rId8"/>
+    <p:sldId id="290" r:id="rId9"/>
+    <p:sldId id="294" r:id="rId10"/>
+    <p:sldId id="284" r:id="rId11"/>
+    <p:sldId id="298" r:id="rId12"/>
+    <p:sldId id="285" r:id="rId13"/>
+    <p:sldId id="297" r:id="rId14"/>
+    <p:sldId id="299" r:id="rId15"/>
+    <p:sldId id="303" r:id="rId16"/>
+    <p:sldId id="292" r:id="rId17"/>
+    <p:sldId id="293" r:id="rId18"/>
+    <p:sldId id="304" r:id="rId19"/>
+    <p:sldId id="296" r:id="rId20"/>
   </p:sldIdLst>
   <p:sldSz cx="9144000" cy="6858000" type="screen4x3"/>
   <p:notesSz cx="6648450" cy="9782175"/>
@@ -3751,6 +3753,314 @@
           <a:p>
             <a:r>
               <a:rPr lang="fr-FR" dirty="0"/>
+              <a:t>Capteur de pression I2C</a:t>
+            </a:r>
+          </a:p>
+        </p:txBody>
+      </p:sp>
+      <p:sp>
+        <p:nvSpPr>
+          <p:cNvPr id="3" name="Espace réservé du contenu 2"/>
+          <p:cNvSpPr>
+            <a:spLocks noGrp="1"/>
+          </p:cNvSpPr>
+          <p:nvPr>
+            <p:ph idx="1"/>
+          </p:nvPr>
+        </p:nvSpPr>
+        <p:spPr>
+          <a:xfrm>
+            <a:off x="179512" y="1412776"/>
+            <a:ext cx="5040559" cy="5040560"/>
+          </a:xfrm>
+        </p:spPr>
+        <p:txBody>
+          <a:bodyPr/>
+          <a:lstStyle/>
+          <a:p>
+            <a:r>
+              <a:rPr lang="fr-FR" dirty="0"/>
+              <a:t>BM280 est un capteur de pression I2C</a:t>
+            </a:r>
+          </a:p>
+          <a:p>
+            <a:pPr lvl="1"/>
+            <a:r>
+              <a:rPr lang="fr-FR" dirty="0"/>
+              <a:t>BME280_float.py</a:t>
+            </a:r>
+          </a:p>
+          <a:p>
+            <a:pPr lvl="1"/>
+            <a:r>
+              <a:rPr lang="fr-FR" dirty="0"/>
+              <a:t>A sauver sur ESP32 avec Save As</a:t>
+            </a:r>
+          </a:p>
+          <a:p>
+            <a:endParaRPr lang="fr-FR" dirty="0"/>
+          </a:p>
+        </p:txBody>
+      </p:sp>
+      <p:pic>
+        <p:nvPicPr>
+          <p:cNvPr id="5" name="Image 4"/>
+          <p:cNvPicPr/>
+          <p:nvPr/>
+        </p:nvPicPr>
+        <p:blipFill>
+          <a:blip r:embed="rId2"/>
+          <a:stretch>
+            <a:fillRect/>
+          </a:stretch>
+        </p:blipFill>
+        <p:spPr>
+          <a:xfrm>
+            <a:off x="5135710" y="1348774"/>
+            <a:ext cx="3104381" cy="1815653"/>
+          </a:xfrm>
+          <a:prstGeom prst="rect">
+            <a:avLst/>
+          </a:prstGeom>
+        </p:spPr>
+      </p:pic>
+      <p:pic>
+        <p:nvPicPr>
+          <p:cNvPr id="7" name="Image 6">
+            <a:extLst>
+              <a:ext uri="{FF2B5EF4-FFF2-40B4-BE49-F238E27FC236}">
+                <a16:creationId xmlns:a16="http://schemas.microsoft.com/office/drawing/2014/main" id="{8B4593B8-53AF-BB9E-9AD1-B0D427340B88}"/>
+              </a:ext>
+            </a:extLst>
+          </p:cNvPr>
+          <p:cNvPicPr>
+            <a:picLocks noChangeAspect="1"/>
+          </p:cNvPicPr>
+          <p:nvPr/>
+        </p:nvPicPr>
+        <p:blipFill>
+          <a:blip r:embed="rId3"/>
+          <a:stretch>
+            <a:fillRect/>
+          </a:stretch>
+        </p:blipFill>
+        <p:spPr>
+          <a:xfrm>
+            <a:off x="1968231" y="4726653"/>
+            <a:ext cx="5639587" cy="1743318"/>
+          </a:xfrm>
+          <a:prstGeom prst="rect">
+            <a:avLst/>
+          </a:prstGeom>
+        </p:spPr>
+      </p:pic>
+    </p:spTree>
+    <p:extLst>
+      <p:ext uri="{BB962C8B-B14F-4D97-AF65-F5344CB8AC3E}">
+        <p14:creationId xmlns:p14="http://schemas.microsoft.com/office/powerpoint/2010/main" val="348249065"/>
+      </p:ext>
+    </p:extLst>
+  </p:cSld>
+  <p:clrMapOvr>
+    <a:masterClrMapping/>
+  </p:clrMapOvr>
+</p:sld>
+</file>
+
+<file path=ppt/slides/slide11.xml><?xml version="1.0" encoding="utf-8"?>
+<p:sld xmlns:a="http://schemas.openxmlformats.org/drawingml/2006/main" xmlns:r="http://schemas.openxmlformats.org/officeDocument/2006/relationships" xmlns:p="http://schemas.openxmlformats.org/presentationml/2006/main">
+  <p:cSld>
+    <p:spTree>
+      <p:nvGrpSpPr>
+        <p:cNvPr id="1" name=""/>
+        <p:cNvGrpSpPr/>
+        <p:nvPr/>
+      </p:nvGrpSpPr>
+      <p:grpSpPr>
+        <a:xfrm>
+          <a:off x="0" y="0"/>
+          <a:ext cx="0" cy="0"/>
+          <a:chOff x="0" y="0"/>
+          <a:chExt cx="0" cy="0"/>
+        </a:xfrm>
+      </p:grpSpPr>
+      <p:sp>
+        <p:nvSpPr>
+          <p:cNvPr id="2" name="Titre 1">
+            <a:extLst>
+              <a:ext uri="{FF2B5EF4-FFF2-40B4-BE49-F238E27FC236}">
+                <a16:creationId xmlns:a16="http://schemas.microsoft.com/office/drawing/2014/main" id="{AA307E13-C1FE-5F93-2E20-65023D456124}"/>
+              </a:ext>
+            </a:extLst>
+          </p:cNvPr>
+          <p:cNvSpPr>
+            <a:spLocks noGrp="1"/>
+          </p:cNvSpPr>
+          <p:nvPr>
+            <p:ph type="title"/>
+          </p:nvPr>
+        </p:nvSpPr>
+        <p:spPr/>
+        <p:txBody>
+          <a:bodyPr/>
+          <a:lstStyle/>
+          <a:p>
+            <a:r>
+              <a:rPr lang="fr-FR" dirty="0"/>
+              <a:t>Branchement</a:t>
+            </a:r>
+          </a:p>
+        </p:txBody>
+      </p:sp>
+      <p:sp>
+        <p:nvSpPr>
+          <p:cNvPr id="3" name="Espace réservé du contenu 2">
+            <a:extLst>
+              <a:ext uri="{FF2B5EF4-FFF2-40B4-BE49-F238E27FC236}">
+                <a16:creationId xmlns:a16="http://schemas.microsoft.com/office/drawing/2014/main" id="{B6FABC04-8983-9588-2C36-465E941D1524}"/>
+              </a:ext>
+            </a:extLst>
+          </p:cNvPr>
+          <p:cNvSpPr>
+            <a:spLocks noGrp="1"/>
+          </p:cNvSpPr>
+          <p:nvPr>
+            <p:ph idx="1"/>
+          </p:nvPr>
+        </p:nvSpPr>
+        <p:spPr/>
+        <p:txBody>
+          <a:bodyPr/>
+          <a:lstStyle/>
+          <a:p>
+            <a:endParaRPr lang="fr-FR"/>
+          </a:p>
+        </p:txBody>
+      </p:sp>
+      <p:pic>
+        <p:nvPicPr>
+          <p:cNvPr id="1026" name="Picture 2" descr="MicroPython : BME280 avec ESP32 et ESP8266 (Pression, Température, Humidité)">
+            <a:extLst>
+              <a:ext uri="{FF2B5EF4-FFF2-40B4-BE49-F238E27FC236}">
+                <a16:creationId xmlns:a16="http://schemas.microsoft.com/office/drawing/2014/main" id="{6AE904DA-5073-5A53-D2EC-50BDAA4800AC}"/>
+              </a:ext>
+            </a:extLst>
+          </p:cNvPr>
+          <p:cNvPicPr>
+            <a:picLocks noChangeAspect="1" noChangeArrowheads="1"/>
+          </p:cNvPicPr>
+          <p:nvPr/>
+        </p:nvPicPr>
+        <p:blipFill>
+          <a:blip r:embed="rId2">
+            <a:extLst>
+              <a:ext uri="{28A0092B-C50C-407E-A947-70E740481C1C}">
+                <a14:useLocalDpi xmlns:a14="http://schemas.microsoft.com/office/drawing/2010/main" val="0"/>
+              </a:ext>
+            </a:extLst>
+          </a:blip>
+          <a:srcRect/>
+          <a:stretch>
+            <a:fillRect/>
+          </a:stretch>
+        </p:blipFill>
+        <p:spPr bwMode="auto">
+          <a:xfrm>
+            <a:off x="914400" y="836712"/>
+            <a:ext cx="6633501" cy="5778401"/>
+          </a:xfrm>
+          <a:prstGeom prst="rect">
+            <a:avLst/>
+          </a:prstGeom>
+          <a:noFill/>
+          <a:extLst>
+            <a:ext uri="{909E8E84-426E-40DD-AFC4-6F175D3DCCD1}">
+              <a14:hiddenFill xmlns:a14="http://schemas.microsoft.com/office/drawing/2010/main">
+                <a:solidFill>
+                  <a:srgbClr val="FFFFFF"/>
+                </a:solidFill>
+              </a14:hiddenFill>
+            </a:ext>
+          </a:extLst>
+        </p:spPr>
+      </p:pic>
+      <p:pic>
+        <p:nvPicPr>
+          <p:cNvPr id="4" name="Image 3">
+            <a:extLst>
+              <a:ext uri="{FF2B5EF4-FFF2-40B4-BE49-F238E27FC236}">
+                <a16:creationId xmlns:a16="http://schemas.microsoft.com/office/drawing/2014/main" id="{050D0363-C604-2494-7A5B-1C49C4E2A036}"/>
+              </a:ext>
+            </a:extLst>
+          </p:cNvPr>
+          <p:cNvPicPr>
+            <a:picLocks noChangeAspect="1"/>
+          </p:cNvPicPr>
+          <p:nvPr/>
+        </p:nvPicPr>
+        <p:blipFill>
+          <a:blip r:embed="rId3"/>
+          <a:stretch>
+            <a:fillRect/>
+          </a:stretch>
+        </p:blipFill>
+        <p:spPr>
+          <a:xfrm>
+            <a:off x="4369117" y="4705032"/>
+            <a:ext cx="4761583" cy="1480384"/>
+          </a:xfrm>
+          <a:prstGeom prst="rect">
+            <a:avLst/>
+          </a:prstGeom>
+        </p:spPr>
+      </p:pic>
+    </p:spTree>
+    <p:extLst>
+      <p:ext uri="{BB962C8B-B14F-4D97-AF65-F5344CB8AC3E}">
+        <p14:creationId xmlns:p14="http://schemas.microsoft.com/office/powerpoint/2010/main" val="976800980"/>
+      </p:ext>
+    </p:extLst>
+  </p:cSld>
+  <p:clrMapOvr>
+    <a:masterClrMapping/>
+  </p:clrMapOvr>
+</p:sld>
+</file>
+
+<file path=ppt/slides/slide12.xml><?xml version="1.0" encoding="utf-8"?>
+<p:sld xmlns:a="http://schemas.openxmlformats.org/drawingml/2006/main" xmlns:r="http://schemas.openxmlformats.org/officeDocument/2006/relationships" xmlns:p="http://schemas.openxmlformats.org/presentationml/2006/main">
+  <p:cSld>
+    <p:spTree>
+      <p:nvGrpSpPr>
+        <p:cNvPr id="1" name=""/>
+        <p:cNvGrpSpPr/>
+        <p:nvPr/>
+      </p:nvGrpSpPr>
+      <p:grpSpPr>
+        <a:xfrm>
+          <a:off x="0" y="0"/>
+          <a:ext cx="0" cy="0"/>
+          <a:chOff x="0" y="0"/>
+          <a:chExt cx="0" cy="0"/>
+        </a:xfrm>
+      </p:grpSpPr>
+      <p:sp>
+        <p:nvSpPr>
+          <p:cNvPr id="2" name="Titre 1"/>
+          <p:cNvSpPr>
+            <a:spLocks noGrp="1"/>
+          </p:cNvSpPr>
+          <p:nvPr>
+            <p:ph type="title"/>
+          </p:nvPr>
+        </p:nvSpPr>
+        <p:spPr/>
+        <p:txBody>
+          <a:bodyPr/>
+          <a:lstStyle/>
+          <a:p>
+            <a:r>
+              <a:rPr lang="fr-FR" dirty="0"/>
               <a:t>Ecran LCD</a:t>
             </a:r>
           </a:p>
@@ -3938,7 +4248,7 @@
 </p:sld>
 </file>
 
-<file path=ppt/slides/slide11.xml><?xml version="1.0" encoding="utf-8"?>
+<file path=ppt/slides/slide13.xml><?xml version="1.0" encoding="utf-8"?>
 <p:sld xmlns:a="http://schemas.openxmlformats.org/drawingml/2006/main" xmlns:r="http://schemas.openxmlformats.org/officeDocument/2006/relationships" xmlns:p="http://schemas.openxmlformats.org/presentationml/2006/main">
   <p:cSld>
     <p:spTree>
@@ -4071,7 +4381,7 @@
 </p:sld>
 </file>
 
-<file path=ppt/slides/slide12.xml><?xml version="1.0" encoding="utf-8"?>
+<file path=ppt/slides/slide14.xml><?xml version="1.0" encoding="utf-8"?>
 <p:sld xmlns:a="http://schemas.openxmlformats.org/drawingml/2006/main" xmlns:r="http://schemas.openxmlformats.org/officeDocument/2006/relationships" xmlns:p="http://schemas.openxmlformats.org/presentationml/2006/main">
   <p:cSld>
     <p:spTree>
@@ -4201,7 +4511,7 @@
 </p:sld>
 </file>
 
-<file path=ppt/slides/slide13.xml><?xml version="1.0" encoding="utf-8"?>
+<file path=ppt/slides/slide15.xml><?xml version="1.0" encoding="utf-8"?>
 <p:sld xmlns:a="http://schemas.openxmlformats.org/drawingml/2006/main" xmlns:r="http://schemas.openxmlformats.org/officeDocument/2006/relationships" xmlns:p="http://schemas.openxmlformats.org/presentationml/2006/main">
   <p:cSld>
     <p:spTree>
@@ -4412,7 +4722,7 @@
 </p:sld>
 </file>
 
-<file path=ppt/slides/slide14.xml><?xml version="1.0" encoding="utf-8"?>
+<file path=ppt/slides/slide16.xml><?xml version="1.0" encoding="utf-8"?>
 <p:sld xmlns:a="http://schemas.openxmlformats.org/drawingml/2006/main" xmlns:r="http://schemas.openxmlformats.org/officeDocument/2006/relationships" xmlns:p="http://schemas.openxmlformats.org/presentationml/2006/main">
   <p:cSld>
     <p:spTree>
@@ -4554,7 +4864,7 @@
 </p:sld>
 </file>
 
-<file path=ppt/slides/slide15.xml><?xml version="1.0" encoding="utf-8"?>
+<file path=ppt/slides/slide17.xml><?xml version="1.0" encoding="utf-8"?>
 <p:sld xmlns:a="http://schemas.openxmlformats.org/drawingml/2006/main" xmlns:r="http://schemas.openxmlformats.org/officeDocument/2006/relationships" xmlns:p="http://schemas.openxmlformats.org/presentationml/2006/main">
   <p:cSld>
     <p:spTree>
@@ -4729,7 +5039,7 @@
 </p:sld>
 </file>
 
-<file path=ppt/slides/slide16.xml><?xml version="1.0" encoding="utf-8"?>
+<file path=ppt/slides/slide18.xml><?xml version="1.0" encoding="utf-8"?>
 <p:sld xmlns:a="http://schemas.openxmlformats.org/drawingml/2006/main" xmlns:r="http://schemas.openxmlformats.org/officeDocument/2006/relationships" xmlns:p="http://schemas.openxmlformats.org/presentationml/2006/main">
   <p:cSld>
     <p:spTree>
@@ -4857,7 +5167,7 @@
 </p:sld>
 </file>
 
-<file path=ppt/slides/slide17.xml><?xml version="1.0" encoding="utf-8"?>
+<file path=ppt/slides/slide19.xml><?xml version="1.0" encoding="utf-8"?>
 <p:sld xmlns:a="http://schemas.openxmlformats.org/drawingml/2006/main" xmlns:r="http://schemas.openxmlformats.org/officeDocument/2006/relationships" xmlns:p="http://schemas.openxmlformats.org/presentationml/2006/main">
   <p:cSld>
     <p:spTree>
@@ -5059,6 +5369,350 @@
           <p:cNvPr id="2" name="Titre 1">
             <a:extLst>
               <a:ext uri="{FF2B5EF4-FFF2-40B4-BE49-F238E27FC236}">
+                <a16:creationId xmlns:a16="http://schemas.microsoft.com/office/drawing/2014/main" id="{9D38F5F3-2EC9-7AE2-A0C7-6617175AFA22}"/>
+              </a:ext>
+            </a:extLst>
+          </p:cNvPr>
+          <p:cNvSpPr>
+            <a:spLocks noGrp="1"/>
+          </p:cNvSpPr>
+          <p:nvPr>
+            <p:ph type="title"/>
+          </p:nvPr>
+        </p:nvSpPr>
+        <p:spPr/>
+        <p:txBody>
+          <a:bodyPr/>
+          <a:lstStyle/>
+          <a:p>
+            <a:r>
+              <a:rPr lang="fr-FR" dirty="0"/>
+              <a:t>Protocole DHT</a:t>
+            </a:r>
+          </a:p>
+        </p:txBody>
+      </p:sp>
+      <p:sp>
+        <p:nvSpPr>
+          <p:cNvPr id="3" name="Espace réservé du contenu 2">
+            <a:extLst>
+              <a:ext uri="{FF2B5EF4-FFF2-40B4-BE49-F238E27FC236}">
+                <a16:creationId xmlns:a16="http://schemas.microsoft.com/office/drawing/2014/main" id="{D9B55325-8B91-5D0D-4DD5-52FFF91D3BB9}"/>
+              </a:ext>
+            </a:extLst>
+          </p:cNvPr>
+          <p:cNvSpPr>
+            <a:spLocks noGrp="1"/>
+          </p:cNvSpPr>
+          <p:nvPr>
+            <p:ph idx="1"/>
+          </p:nvPr>
+        </p:nvSpPr>
+        <p:spPr/>
+        <p:txBody>
+          <a:bodyPr/>
+          <a:lstStyle/>
+          <a:p>
+            <a:r>
+              <a:rPr lang="fr-FR" dirty="0"/>
+              <a:t>DHT</a:t>
+            </a:r>
+          </a:p>
+          <a:p>
+            <a:pPr lvl="1"/>
+            <a:r>
+              <a:rPr lang="fr-FR" dirty="0"/>
+              <a:t>Très peu chère</a:t>
+            </a:r>
+          </a:p>
+          <a:p>
+            <a:pPr lvl="1"/>
+            <a:r>
+              <a:rPr lang="fr-FR" dirty="0"/>
+              <a:t>Protocole propriétaire sans horloge</a:t>
+            </a:r>
+          </a:p>
+          <a:p>
+            <a:pPr lvl="1"/>
+            <a:r>
+              <a:rPr lang="fr-FR" dirty="0"/>
+              <a:t>Utilise 1 seul pin digital (30 bits à chaque requête)</a:t>
+            </a:r>
+          </a:p>
+          <a:p>
+            <a:pPr lvl="1"/>
+            <a:r>
+              <a:rPr lang="fr-FR" dirty="0"/>
+              <a:t>De ce fait il est très lent (1 secondes)</a:t>
+            </a:r>
+          </a:p>
+          <a:p>
+            <a:pPr lvl="1"/>
+            <a:r>
+              <a:rPr lang="fr-FR" dirty="0"/>
+              <a:t>Bibliothèque DHT incluse par défaut</a:t>
+            </a:r>
+          </a:p>
+          <a:p>
+            <a:pPr lvl="1"/>
+            <a:r>
+              <a:rPr lang="fr-FR" dirty="0"/>
+              <a:t>Ici le DHT11</a:t>
+            </a:r>
+          </a:p>
+          <a:p>
+            <a:pPr lvl="1"/>
+            <a:r>
+              <a:rPr lang="fr-FR" dirty="0"/>
+              <a:t>import </a:t>
+            </a:r>
+            <a:r>
+              <a:rPr lang="fr-FR" dirty="0" err="1"/>
+              <a:t>dth</a:t>
+            </a:r>
+            <a:endParaRPr lang="fr-FR" dirty="0"/>
+          </a:p>
+          <a:p>
+            <a:pPr lvl="1"/>
+            <a:r>
+              <a:rPr lang="fr-FR" dirty="0"/>
+              <a:t>dht11 = capteur = dht.DHT11(Pin(17))</a:t>
+            </a:r>
+          </a:p>
+          <a:p>
+            <a:pPr lvl="1"/>
+            <a:r>
+              <a:rPr lang="fr-FR" dirty="0" err="1"/>
+              <a:t>capteur.measure</a:t>
+            </a:r>
+            <a:r>
+              <a:rPr lang="fr-FR" dirty="0"/>
+              <a:t>()</a:t>
+            </a:r>
+          </a:p>
+          <a:p>
+            <a:pPr lvl="1"/>
+            <a:r>
+              <a:rPr lang="fr-FR" dirty="0" err="1"/>
+              <a:t>capteur.temperature</a:t>
+            </a:r>
+            <a:r>
+              <a:rPr lang="fr-FR" dirty="0"/>
+              <a:t>() et </a:t>
+            </a:r>
+            <a:r>
+              <a:rPr lang="fr-FR" dirty="0" err="1"/>
+              <a:t>humindity</a:t>
+            </a:r>
+            <a:endParaRPr lang="fr-FR" dirty="0"/>
+          </a:p>
+        </p:txBody>
+      </p:sp>
+      <p:pic>
+        <p:nvPicPr>
+          <p:cNvPr id="5" name="Image 4">
+            <a:extLst>
+              <a:ext uri="{FF2B5EF4-FFF2-40B4-BE49-F238E27FC236}">
+                <a16:creationId xmlns:a16="http://schemas.microsoft.com/office/drawing/2014/main" id="{2FD0537E-4448-4A5A-1C1B-03AF39C461FD}"/>
+              </a:ext>
+            </a:extLst>
+          </p:cNvPr>
+          <p:cNvPicPr>
+            <a:picLocks noChangeAspect="1"/>
+          </p:cNvPicPr>
+          <p:nvPr/>
+        </p:nvPicPr>
+        <p:blipFill>
+          <a:blip r:embed="rId2"/>
+          <a:stretch>
+            <a:fillRect/>
+          </a:stretch>
+        </p:blipFill>
+        <p:spPr>
+          <a:xfrm>
+            <a:off x="6372200" y="3573016"/>
+            <a:ext cx="2381582" cy="2105319"/>
+          </a:xfrm>
+          <a:prstGeom prst="rect">
+            <a:avLst/>
+          </a:prstGeom>
+        </p:spPr>
+      </p:pic>
+    </p:spTree>
+    <p:extLst>
+      <p:ext uri="{BB962C8B-B14F-4D97-AF65-F5344CB8AC3E}">
+        <p14:creationId xmlns:p14="http://schemas.microsoft.com/office/powerpoint/2010/main" val="4098682543"/>
+      </p:ext>
+    </p:extLst>
+  </p:cSld>
+  <p:clrMapOvr>
+    <a:masterClrMapping/>
+  </p:clrMapOvr>
+</p:sld>
+</file>
+
+<file path=ppt/slides/slide3.xml><?xml version="1.0" encoding="utf-8"?>
+<p:sld xmlns:a="http://schemas.openxmlformats.org/drawingml/2006/main" xmlns:r="http://schemas.openxmlformats.org/officeDocument/2006/relationships" xmlns:p="http://schemas.openxmlformats.org/presentationml/2006/main">
+  <p:cSld>
+    <p:spTree>
+      <p:nvGrpSpPr>
+        <p:cNvPr id="1" name=""/>
+        <p:cNvGrpSpPr/>
+        <p:nvPr/>
+      </p:nvGrpSpPr>
+      <p:grpSpPr>
+        <a:xfrm>
+          <a:off x="0" y="0"/>
+          <a:ext cx="0" cy="0"/>
+          <a:chOff x="0" y="0"/>
+          <a:chExt cx="0" cy="0"/>
+        </a:xfrm>
+      </p:grpSpPr>
+      <p:sp>
+        <p:nvSpPr>
+          <p:cNvPr id="2" name="Titre 1">
+            <a:extLst>
+              <a:ext uri="{FF2B5EF4-FFF2-40B4-BE49-F238E27FC236}">
+                <a16:creationId xmlns:a16="http://schemas.microsoft.com/office/drawing/2014/main" id="{6807916F-BF1E-9C7E-2882-8E05FCAD6D3B}"/>
+              </a:ext>
+            </a:extLst>
+          </p:cNvPr>
+          <p:cNvSpPr>
+            <a:spLocks noGrp="1"/>
+          </p:cNvSpPr>
+          <p:nvPr>
+            <p:ph type="title"/>
+          </p:nvPr>
+        </p:nvSpPr>
+        <p:spPr/>
+        <p:txBody>
+          <a:bodyPr/>
+          <a:lstStyle/>
+          <a:p>
+            <a:r>
+              <a:rPr lang="fr-FR" dirty="0"/>
+              <a:t>DHT11</a:t>
+            </a:r>
+          </a:p>
+        </p:txBody>
+      </p:sp>
+      <p:sp>
+        <p:nvSpPr>
+          <p:cNvPr id="3" name="Espace réservé du contenu 2">
+            <a:extLst>
+              <a:ext uri="{FF2B5EF4-FFF2-40B4-BE49-F238E27FC236}">
+                <a16:creationId xmlns:a16="http://schemas.microsoft.com/office/drawing/2014/main" id="{1702CEE3-1724-EB8F-E23B-34C57195CD9B}"/>
+              </a:ext>
+            </a:extLst>
+          </p:cNvPr>
+          <p:cNvSpPr>
+            <a:spLocks noGrp="1"/>
+          </p:cNvSpPr>
+          <p:nvPr>
+            <p:ph idx="1"/>
+          </p:nvPr>
+        </p:nvSpPr>
+        <p:spPr/>
+        <p:txBody>
+          <a:bodyPr/>
+          <a:lstStyle/>
+          <a:p>
+            <a:r>
+              <a:rPr lang="fr-FR" dirty="0"/>
+              <a:t>Attention au branchement 3.3v et au sens</a:t>
+            </a:r>
+          </a:p>
+          <a:p>
+            <a:pPr lvl="1"/>
+            <a:r>
+              <a:rPr lang="fr-FR" dirty="0"/>
+              <a:t>J'en ai grillé 1 facilement</a:t>
+            </a:r>
+          </a:p>
+        </p:txBody>
+      </p:sp>
+      <p:pic>
+        <p:nvPicPr>
+          <p:cNvPr id="2050" name="Picture 2" descr="Câblage du DHT11 et esp32 wroom">
+            <a:extLst>
+              <a:ext uri="{FF2B5EF4-FFF2-40B4-BE49-F238E27FC236}">
+                <a16:creationId xmlns:a16="http://schemas.microsoft.com/office/drawing/2014/main" id="{A4A163B3-6FAB-84EA-25D0-8095857540A1}"/>
+              </a:ext>
+            </a:extLst>
+          </p:cNvPr>
+          <p:cNvPicPr>
+            <a:picLocks noChangeAspect="1" noChangeArrowheads="1"/>
+          </p:cNvPicPr>
+          <p:nvPr/>
+        </p:nvPicPr>
+        <p:blipFill>
+          <a:blip r:embed="rId2">
+            <a:extLst>
+              <a:ext uri="{28A0092B-C50C-407E-A947-70E740481C1C}">
+                <a14:useLocalDpi xmlns:a14="http://schemas.microsoft.com/office/drawing/2010/main" val="0"/>
+              </a:ext>
+            </a:extLst>
+          </a:blip>
+          <a:srcRect/>
+          <a:stretch>
+            <a:fillRect/>
+          </a:stretch>
+        </p:blipFill>
+        <p:spPr bwMode="auto">
+          <a:xfrm>
+            <a:off x="1193131" y="3042111"/>
+            <a:ext cx="5364088" cy="3411225"/>
+          </a:xfrm>
+          <a:prstGeom prst="rect">
+            <a:avLst/>
+          </a:prstGeom>
+          <a:noFill/>
+          <a:extLst>
+            <a:ext uri="{909E8E84-426E-40DD-AFC4-6F175D3DCCD1}">
+              <a14:hiddenFill xmlns:a14="http://schemas.microsoft.com/office/drawing/2010/main">
+                <a:solidFill>
+                  <a:srgbClr val="FFFFFF"/>
+                </a:solidFill>
+              </a14:hiddenFill>
+            </a:ext>
+          </a:extLst>
+        </p:spPr>
+      </p:pic>
+    </p:spTree>
+    <p:extLst>
+      <p:ext uri="{BB962C8B-B14F-4D97-AF65-F5344CB8AC3E}">
+        <p14:creationId xmlns:p14="http://schemas.microsoft.com/office/powerpoint/2010/main" val="4191360856"/>
+      </p:ext>
+    </p:extLst>
+  </p:cSld>
+  <p:clrMapOvr>
+    <a:masterClrMapping/>
+  </p:clrMapOvr>
+</p:sld>
+</file>
+
+<file path=ppt/slides/slide4.xml><?xml version="1.0" encoding="utf-8"?>
+<p:sld xmlns:a="http://schemas.openxmlformats.org/drawingml/2006/main" xmlns:r="http://schemas.openxmlformats.org/officeDocument/2006/relationships" xmlns:p="http://schemas.openxmlformats.org/presentationml/2006/main">
+  <p:cSld>
+    <p:spTree>
+      <p:nvGrpSpPr>
+        <p:cNvPr id="1" name=""/>
+        <p:cNvGrpSpPr/>
+        <p:nvPr/>
+      </p:nvGrpSpPr>
+      <p:grpSpPr>
+        <a:xfrm>
+          <a:off x="0" y="0"/>
+          <a:ext cx="0" cy="0"/>
+          <a:chOff x="0" y="0"/>
+          <a:chExt cx="0" cy="0"/>
+        </a:xfrm>
+      </p:grpSpPr>
+      <p:sp>
+        <p:nvSpPr>
+          <p:cNvPr id="2" name="Titre 1">
+            <a:extLst>
+              <a:ext uri="{FF2B5EF4-FFF2-40B4-BE49-F238E27FC236}">
                 <a16:creationId xmlns:a16="http://schemas.microsoft.com/office/drawing/2014/main" id="{BE9FDABE-0D98-6750-62DE-5F18AC44EE2B}"/>
               </a:ext>
             </a:extLst>
@@ -5148,7 +5802,7 @@
 </p:sld>
 </file>
 
-<file path=ppt/slides/slide3.xml><?xml version="1.0" encoding="utf-8"?>
+<file path=ppt/slides/slide5.xml><?xml version="1.0" encoding="utf-8"?>
 <p:sld xmlns:a="http://schemas.openxmlformats.org/drawingml/2006/main" xmlns:r="http://schemas.openxmlformats.org/officeDocument/2006/relationships" xmlns:p="http://schemas.openxmlformats.org/presentationml/2006/main">
   <p:cSld>
     <p:spTree>
@@ -5293,7 +5947,7 @@
 </p:sld>
 </file>
 
-<file path=ppt/slides/slide4.xml><?xml version="1.0" encoding="utf-8"?>
+<file path=ppt/slides/slide6.xml><?xml version="1.0" encoding="utf-8"?>
 <p:sld xmlns:a="http://schemas.openxmlformats.org/drawingml/2006/main" xmlns:r="http://schemas.openxmlformats.org/officeDocument/2006/relationships" xmlns:p="http://schemas.openxmlformats.org/presentationml/2006/main">
   <p:cSld>
     <p:spTree>
@@ -5479,7 +6133,7 @@
 </p:sld>
 </file>
 
-<file path=ppt/slides/slide5.xml><?xml version="1.0" encoding="utf-8"?>
+<file path=ppt/slides/slide7.xml><?xml version="1.0" encoding="utf-8"?>
 <p:sld xmlns:a="http://schemas.openxmlformats.org/drawingml/2006/main" xmlns:r="http://schemas.openxmlformats.org/officeDocument/2006/relationships" xmlns:p="http://schemas.openxmlformats.org/presentationml/2006/main">
   <p:cSld>
     <p:spTree>
@@ -5581,7 +6235,7 @@
 </p:sld>
 </file>
 
-<file path=ppt/slides/slide6.xml><?xml version="1.0" encoding="utf-8"?>
+<file path=ppt/slides/slide8.xml><?xml version="1.0" encoding="utf-8"?>
 <p:sld xmlns:a="http://schemas.openxmlformats.org/drawingml/2006/main" xmlns:r="http://schemas.openxmlformats.org/officeDocument/2006/relationships" xmlns:p="http://schemas.openxmlformats.org/presentationml/2006/main">
   <p:cSld>
     <p:spTree>
@@ -5701,7 +6355,7 @@
 </p:sld>
 </file>
 
-<file path=ppt/slides/slide7.xml><?xml version="1.0" encoding="utf-8"?>
+<file path=ppt/slides/slide9.xml><?xml version="1.0" encoding="utf-8"?>
 <p:sld xmlns:a="http://schemas.openxmlformats.org/drawingml/2006/main" xmlns:r="http://schemas.openxmlformats.org/officeDocument/2006/relationships" xmlns:p="http://schemas.openxmlformats.org/presentationml/2006/main">
   <p:cSld>
     <p:spTree>
@@ -5818,314 +6472,6 @@
     <p:extLst>
       <p:ext uri="{BB962C8B-B14F-4D97-AF65-F5344CB8AC3E}">
         <p14:creationId xmlns:p14="http://schemas.microsoft.com/office/powerpoint/2010/main" val="2295480703"/>
-      </p:ext>
-    </p:extLst>
-  </p:cSld>
-  <p:clrMapOvr>
-    <a:masterClrMapping/>
-  </p:clrMapOvr>
-</p:sld>
-</file>
-
-<file path=ppt/slides/slide8.xml><?xml version="1.0" encoding="utf-8"?>
-<p:sld xmlns:a="http://schemas.openxmlformats.org/drawingml/2006/main" xmlns:r="http://schemas.openxmlformats.org/officeDocument/2006/relationships" xmlns:p="http://schemas.openxmlformats.org/presentationml/2006/main">
-  <p:cSld>
-    <p:spTree>
-      <p:nvGrpSpPr>
-        <p:cNvPr id="1" name=""/>
-        <p:cNvGrpSpPr/>
-        <p:nvPr/>
-      </p:nvGrpSpPr>
-      <p:grpSpPr>
-        <a:xfrm>
-          <a:off x="0" y="0"/>
-          <a:ext cx="0" cy="0"/>
-          <a:chOff x="0" y="0"/>
-          <a:chExt cx="0" cy="0"/>
-        </a:xfrm>
-      </p:grpSpPr>
-      <p:sp>
-        <p:nvSpPr>
-          <p:cNvPr id="2" name="Titre 1"/>
-          <p:cNvSpPr>
-            <a:spLocks noGrp="1"/>
-          </p:cNvSpPr>
-          <p:nvPr>
-            <p:ph type="title"/>
-          </p:nvPr>
-        </p:nvSpPr>
-        <p:spPr/>
-        <p:txBody>
-          <a:bodyPr/>
-          <a:lstStyle/>
-          <a:p>
-            <a:r>
-              <a:rPr lang="fr-FR" dirty="0"/>
-              <a:t>Capteur de pression I2C</a:t>
-            </a:r>
-          </a:p>
-        </p:txBody>
-      </p:sp>
-      <p:sp>
-        <p:nvSpPr>
-          <p:cNvPr id="3" name="Espace réservé du contenu 2"/>
-          <p:cNvSpPr>
-            <a:spLocks noGrp="1"/>
-          </p:cNvSpPr>
-          <p:nvPr>
-            <p:ph idx="1"/>
-          </p:nvPr>
-        </p:nvSpPr>
-        <p:spPr>
-          <a:xfrm>
-            <a:off x="179512" y="1412776"/>
-            <a:ext cx="5040559" cy="5040560"/>
-          </a:xfrm>
-        </p:spPr>
-        <p:txBody>
-          <a:bodyPr/>
-          <a:lstStyle/>
-          <a:p>
-            <a:r>
-              <a:rPr lang="fr-FR" dirty="0"/>
-              <a:t>BM280 est un capteur de pression I2C</a:t>
-            </a:r>
-          </a:p>
-          <a:p>
-            <a:pPr lvl="1"/>
-            <a:r>
-              <a:rPr lang="fr-FR" dirty="0"/>
-              <a:t>BME280_float.py</a:t>
-            </a:r>
-          </a:p>
-          <a:p>
-            <a:pPr lvl="1"/>
-            <a:r>
-              <a:rPr lang="fr-FR" dirty="0"/>
-              <a:t>A sauver sur ESP32 avec Save As</a:t>
-            </a:r>
-          </a:p>
-          <a:p>
-            <a:endParaRPr lang="fr-FR" dirty="0"/>
-          </a:p>
-        </p:txBody>
-      </p:sp>
-      <p:pic>
-        <p:nvPicPr>
-          <p:cNvPr id="5" name="Image 4"/>
-          <p:cNvPicPr/>
-          <p:nvPr/>
-        </p:nvPicPr>
-        <p:blipFill>
-          <a:blip r:embed="rId2"/>
-          <a:stretch>
-            <a:fillRect/>
-          </a:stretch>
-        </p:blipFill>
-        <p:spPr>
-          <a:xfrm>
-            <a:off x="5135710" y="1348774"/>
-            <a:ext cx="3104381" cy="1815653"/>
-          </a:xfrm>
-          <a:prstGeom prst="rect">
-            <a:avLst/>
-          </a:prstGeom>
-        </p:spPr>
-      </p:pic>
-      <p:pic>
-        <p:nvPicPr>
-          <p:cNvPr id="7" name="Image 6">
-            <a:extLst>
-              <a:ext uri="{FF2B5EF4-FFF2-40B4-BE49-F238E27FC236}">
-                <a16:creationId xmlns:a16="http://schemas.microsoft.com/office/drawing/2014/main" id="{8B4593B8-53AF-BB9E-9AD1-B0D427340B88}"/>
-              </a:ext>
-            </a:extLst>
-          </p:cNvPr>
-          <p:cNvPicPr>
-            <a:picLocks noChangeAspect="1"/>
-          </p:cNvPicPr>
-          <p:nvPr/>
-        </p:nvPicPr>
-        <p:blipFill>
-          <a:blip r:embed="rId3"/>
-          <a:stretch>
-            <a:fillRect/>
-          </a:stretch>
-        </p:blipFill>
-        <p:spPr>
-          <a:xfrm>
-            <a:off x="1968231" y="4726653"/>
-            <a:ext cx="5639587" cy="1743318"/>
-          </a:xfrm>
-          <a:prstGeom prst="rect">
-            <a:avLst/>
-          </a:prstGeom>
-        </p:spPr>
-      </p:pic>
-    </p:spTree>
-    <p:extLst>
-      <p:ext uri="{BB962C8B-B14F-4D97-AF65-F5344CB8AC3E}">
-        <p14:creationId xmlns:p14="http://schemas.microsoft.com/office/powerpoint/2010/main" val="348249065"/>
-      </p:ext>
-    </p:extLst>
-  </p:cSld>
-  <p:clrMapOvr>
-    <a:masterClrMapping/>
-  </p:clrMapOvr>
-</p:sld>
-</file>
-
-<file path=ppt/slides/slide9.xml><?xml version="1.0" encoding="utf-8"?>
-<p:sld xmlns:a="http://schemas.openxmlformats.org/drawingml/2006/main" xmlns:r="http://schemas.openxmlformats.org/officeDocument/2006/relationships" xmlns:p="http://schemas.openxmlformats.org/presentationml/2006/main">
-  <p:cSld>
-    <p:spTree>
-      <p:nvGrpSpPr>
-        <p:cNvPr id="1" name=""/>
-        <p:cNvGrpSpPr/>
-        <p:nvPr/>
-      </p:nvGrpSpPr>
-      <p:grpSpPr>
-        <a:xfrm>
-          <a:off x="0" y="0"/>
-          <a:ext cx="0" cy="0"/>
-          <a:chOff x="0" y="0"/>
-          <a:chExt cx="0" cy="0"/>
-        </a:xfrm>
-      </p:grpSpPr>
-      <p:sp>
-        <p:nvSpPr>
-          <p:cNvPr id="2" name="Titre 1">
-            <a:extLst>
-              <a:ext uri="{FF2B5EF4-FFF2-40B4-BE49-F238E27FC236}">
-                <a16:creationId xmlns:a16="http://schemas.microsoft.com/office/drawing/2014/main" id="{AA307E13-C1FE-5F93-2E20-65023D456124}"/>
-              </a:ext>
-            </a:extLst>
-          </p:cNvPr>
-          <p:cNvSpPr>
-            <a:spLocks noGrp="1"/>
-          </p:cNvSpPr>
-          <p:nvPr>
-            <p:ph type="title"/>
-          </p:nvPr>
-        </p:nvSpPr>
-        <p:spPr/>
-        <p:txBody>
-          <a:bodyPr/>
-          <a:lstStyle/>
-          <a:p>
-            <a:r>
-              <a:rPr lang="fr-FR" dirty="0"/>
-              <a:t>Branchement</a:t>
-            </a:r>
-          </a:p>
-        </p:txBody>
-      </p:sp>
-      <p:sp>
-        <p:nvSpPr>
-          <p:cNvPr id="3" name="Espace réservé du contenu 2">
-            <a:extLst>
-              <a:ext uri="{FF2B5EF4-FFF2-40B4-BE49-F238E27FC236}">
-                <a16:creationId xmlns:a16="http://schemas.microsoft.com/office/drawing/2014/main" id="{B6FABC04-8983-9588-2C36-465E941D1524}"/>
-              </a:ext>
-            </a:extLst>
-          </p:cNvPr>
-          <p:cNvSpPr>
-            <a:spLocks noGrp="1"/>
-          </p:cNvSpPr>
-          <p:nvPr>
-            <p:ph idx="1"/>
-          </p:nvPr>
-        </p:nvSpPr>
-        <p:spPr/>
-        <p:txBody>
-          <a:bodyPr/>
-          <a:lstStyle/>
-          <a:p>
-            <a:endParaRPr lang="fr-FR"/>
-          </a:p>
-        </p:txBody>
-      </p:sp>
-      <p:pic>
-        <p:nvPicPr>
-          <p:cNvPr id="1026" name="Picture 2" descr="MicroPython : BME280 avec ESP32 et ESP8266 (Pression, Température, Humidité)">
-            <a:extLst>
-              <a:ext uri="{FF2B5EF4-FFF2-40B4-BE49-F238E27FC236}">
-                <a16:creationId xmlns:a16="http://schemas.microsoft.com/office/drawing/2014/main" id="{6AE904DA-5073-5A53-D2EC-50BDAA4800AC}"/>
-              </a:ext>
-            </a:extLst>
-          </p:cNvPr>
-          <p:cNvPicPr>
-            <a:picLocks noChangeAspect="1" noChangeArrowheads="1"/>
-          </p:cNvPicPr>
-          <p:nvPr/>
-        </p:nvPicPr>
-        <p:blipFill>
-          <a:blip r:embed="rId2">
-            <a:extLst>
-              <a:ext uri="{28A0092B-C50C-407E-A947-70E740481C1C}">
-                <a14:useLocalDpi xmlns:a14="http://schemas.microsoft.com/office/drawing/2010/main" val="0"/>
-              </a:ext>
-            </a:extLst>
-          </a:blip>
-          <a:srcRect/>
-          <a:stretch>
-            <a:fillRect/>
-          </a:stretch>
-        </p:blipFill>
-        <p:spPr bwMode="auto">
-          <a:xfrm>
-            <a:off x="914400" y="836712"/>
-            <a:ext cx="6633501" cy="5778401"/>
-          </a:xfrm>
-          <a:prstGeom prst="rect">
-            <a:avLst/>
-          </a:prstGeom>
-          <a:noFill/>
-          <a:extLst>
-            <a:ext uri="{909E8E84-426E-40DD-AFC4-6F175D3DCCD1}">
-              <a14:hiddenFill xmlns:a14="http://schemas.microsoft.com/office/drawing/2010/main">
-                <a:solidFill>
-                  <a:srgbClr val="FFFFFF"/>
-                </a:solidFill>
-              </a14:hiddenFill>
-            </a:ext>
-          </a:extLst>
-        </p:spPr>
-      </p:pic>
-      <p:pic>
-        <p:nvPicPr>
-          <p:cNvPr id="4" name="Image 3">
-            <a:extLst>
-              <a:ext uri="{FF2B5EF4-FFF2-40B4-BE49-F238E27FC236}">
-                <a16:creationId xmlns:a16="http://schemas.microsoft.com/office/drawing/2014/main" id="{050D0363-C604-2494-7A5B-1C49C4E2A036}"/>
-              </a:ext>
-            </a:extLst>
-          </p:cNvPr>
-          <p:cNvPicPr>
-            <a:picLocks noChangeAspect="1"/>
-          </p:cNvPicPr>
-          <p:nvPr/>
-        </p:nvPicPr>
-        <p:blipFill>
-          <a:blip r:embed="rId3"/>
-          <a:stretch>
-            <a:fillRect/>
-          </a:stretch>
-        </p:blipFill>
-        <p:spPr>
-          <a:xfrm>
-            <a:off x="4369117" y="4705032"/>
-            <a:ext cx="4761583" cy="1480384"/>
-          </a:xfrm>
-          <a:prstGeom prst="rect">
-            <a:avLst/>
-          </a:prstGeom>
-        </p:spPr>
-      </p:pic>
-    </p:spTree>
-    <p:extLst>
-      <p:ext uri="{BB962C8B-B14F-4D97-AF65-F5344CB8AC3E}">
-        <p14:creationId xmlns:p14="http://schemas.microsoft.com/office/powerpoint/2010/main" val="976800980"/>
       </p:ext>
     </p:extLst>
   </p:cSld>

</xml_diff>